<commit_message>
Update plotting and export
</commit_message>
<xml_diff>
--- a/CDC20.pptx
+++ b/CDC20.pptx
@@ -7,7 +7,6 @@
   <p:sldIdLst>
     <p:sldId id="257" r:id="rId2"/>
     <p:sldId id="256" r:id="rId3"/>
-    <p:sldId id="258" r:id="rId4"/>
   </p:sldIdLst>
   <p:sldSz cx="12192000" cy="6858000"/>
   <p:notesSz cx="6858000" cy="9144000"/>
@@ -136,7 +135,7 @@
           <p:cNvPr id="2" name="标题 1">
             <a:extLst>
               <a:ext uri="{FF2B5EF4-FFF2-40B4-BE49-F238E27FC236}">
-                <a16:creationId xmlns:a16="http://schemas.microsoft.com/office/drawing/2014/main" xmlns="" id="{60BF65FA-DEB4-4824-97B7-993A5FCC6ED1}"/>
+                <a16:creationId xmlns="" xmlns:a16="http://schemas.microsoft.com/office/drawing/2014/main" id="{60BF65FA-DEB4-4824-97B7-993A5FCC6ED1}"/>
               </a:ext>
             </a:extLst>
           </p:cNvPr>
@@ -173,7 +172,7 @@
           <p:cNvPr id="3" name="副标题 2">
             <a:extLst>
               <a:ext uri="{FF2B5EF4-FFF2-40B4-BE49-F238E27FC236}">
-                <a16:creationId xmlns:a16="http://schemas.microsoft.com/office/drawing/2014/main" xmlns="" id="{73FE0C94-14A0-45AE-A78B-A38D4287BF96}"/>
+                <a16:creationId xmlns="" xmlns:a16="http://schemas.microsoft.com/office/drawing/2014/main" id="{73FE0C94-14A0-45AE-A78B-A38D4287BF96}"/>
               </a:ext>
             </a:extLst>
           </p:cNvPr>
@@ -243,7 +242,7 @@
           <p:cNvPr id="4" name="日期占位符 3">
             <a:extLst>
               <a:ext uri="{FF2B5EF4-FFF2-40B4-BE49-F238E27FC236}">
-                <a16:creationId xmlns:a16="http://schemas.microsoft.com/office/drawing/2014/main" xmlns="" id="{5DB7F20A-37D5-451E-A84A-06026E4837AF}"/>
+                <a16:creationId xmlns="" xmlns:a16="http://schemas.microsoft.com/office/drawing/2014/main" id="{5DB7F20A-37D5-451E-A84A-06026E4837AF}"/>
               </a:ext>
             </a:extLst>
           </p:cNvPr>
@@ -261,7 +260,7 @@
           <a:p>
             <a:fld id="{EFF7FE2E-0BFA-440F-91A0-26B1E64D9FE8}" type="datetimeFigureOut">
               <a:rPr lang="zh-CN" altLang="en-US" smtClean="0"/>
-              <a:t>2020/4/9</a:t>
+              <a:t>2020/4/10</a:t>
             </a:fld>
             <a:endParaRPr lang="zh-CN" altLang="en-US"/>
           </a:p>
@@ -272,7 +271,7 @@
           <p:cNvPr id="5" name="页脚占位符 4">
             <a:extLst>
               <a:ext uri="{FF2B5EF4-FFF2-40B4-BE49-F238E27FC236}">
-                <a16:creationId xmlns:a16="http://schemas.microsoft.com/office/drawing/2014/main" xmlns="" id="{F0BA4807-BDE0-4956-9548-EF03E8F16C00}"/>
+                <a16:creationId xmlns="" xmlns:a16="http://schemas.microsoft.com/office/drawing/2014/main" id="{F0BA4807-BDE0-4956-9548-EF03E8F16C00}"/>
               </a:ext>
             </a:extLst>
           </p:cNvPr>
@@ -297,7 +296,7 @@
           <p:cNvPr id="6" name="灯片编号占位符 5">
             <a:extLst>
               <a:ext uri="{FF2B5EF4-FFF2-40B4-BE49-F238E27FC236}">
-                <a16:creationId xmlns:a16="http://schemas.microsoft.com/office/drawing/2014/main" xmlns="" id="{B65C72C4-C8F5-4011-880E-915BFF38C0DC}"/>
+                <a16:creationId xmlns="" xmlns:a16="http://schemas.microsoft.com/office/drawing/2014/main" id="{B65C72C4-C8F5-4011-880E-915BFF38C0DC}"/>
               </a:ext>
             </a:extLst>
           </p:cNvPr>
@@ -356,7 +355,7 @@
           <p:cNvPr id="2" name="标题 1">
             <a:extLst>
               <a:ext uri="{FF2B5EF4-FFF2-40B4-BE49-F238E27FC236}">
-                <a16:creationId xmlns:a16="http://schemas.microsoft.com/office/drawing/2014/main" xmlns="" id="{E6869211-3C5D-43A1-BA28-980129CDA88A}"/>
+                <a16:creationId xmlns="" xmlns:a16="http://schemas.microsoft.com/office/drawing/2014/main" id="{E6869211-3C5D-43A1-BA28-980129CDA88A}"/>
               </a:ext>
             </a:extLst>
           </p:cNvPr>
@@ -384,7 +383,7 @@
           <p:cNvPr id="3" name="竖排文字占位符 2">
             <a:extLst>
               <a:ext uri="{FF2B5EF4-FFF2-40B4-BE49-F238E27FC236}">
-                <a16:creationId xmlns:a16="http://schemas.microsoft.com/office/drawing/2014/main" xmlns="" id="{58E92E33-25B2-4720-8E68-207F1E2BC1C5}"/>
+                <a16:creationId xmlns="" xmlns:a16="http://schemas.microsoft.com/office/drawing/2014/main" id="{58E92E33-25B2-4720-8E68-207F1E2BC1C5}"/>
               </a:ext>
             </a:extLst>
           </p:cNvPr>
@@ -441,7 +440,7 @@
           <p:cNvPr id="4" name="日期占位符 3">
             <a:extLst>
               <a:ext uri="{FF2B5EF4-FFF2-40B4-BE49-F238E27FC236}">
-                <a16:creationId xmlns:a16="http://schemas.microsoft.com/office/drawing/2014/main" xmlns="" id="{F2168EA6-A9BD-4F95-B17F-F62572E23ABB}"/>
+                <a16:creationId xmlns="" xmlns:a16="http://schemas.microsoft.com/office/drawing/2014/main" id="{F2168EA6-A9BD-4F95-B17F-F62572E23ABB}"/>
               </a:ext>
             </a:extLst>
           </p:cNvPr>
@@ -459,7 +458,7 @@
           <a:p>
             <a:fld id="{EFF7FE2E-0BFA-440F-91A0-26B1E64D9FE8}" type="datetimeFigureOut">
               <a:rPr lang="zh-CN" altLang="en-US" smtClean="0"/>
-              <a:t>2020/4/9</a:t>
+              <a:t>2020/4/10</a:t>
             </a:fld>
             <a:endParaRPr lang="zh-CN" altLang="en-US"/>
           </a:p>
@@ -470,7 +469,7 @@
           <p:cNvPr id="5" name="页脚占位符 4">
             <a:extLst>
               <a:ext uri="{FF2B5EF4-FFF2-40B4-BE49-F238E27FC236}">
-                <a16:creationId xmlns:a16="http://schemas.microsoft.com/office/drawing/2014/main" xmlns="" id="{248B11E7-AECF-40F1-AB58-9CA4A57BF8E0}"/>
+                <a16:creationId xmlns="" xmlns:a16="http://schemas.microsoft.com/office/drawing/2014/main" id="{248B11E7-AECF-40F1-AB58-9CA4A57BF8E0}"/>
               </a:ext>
             </a:extLst>
           </p:cNvPr>
@@ -495,7 +494,7 @@
           <p:cNvPr id="6" name="灯片编号占位符 5">
             <a:extLst>
               <a:ext uri="{FF2B5EF4-FFF2-40B4-BE49-F238E27FC236}">
-                <a16:creationId xmlns:a16="http://schemas.microsoft.com/office/drawing/2014/main" xmlns="" id="{9AA40D9F-16C9-4BF4-A9CD-85F0A58FF969}"/>
+                <a16:creationId xmlns="" xmlns:a16="http://schemas.microsoft.com/office/drawing/2014/main" id="{9AA40D9F-16C9-4BF4-A9CD-85F0A58FF969}"/>
               </a:ext>
             </a:extLst>
           </p:cNvPr>
@@ -554,7 +553,7 @@
           <p:cNvPr id="2" name="竖排标题 1">
             <a:extLst>
               <a:ext uri="{FF2B5EF4-FFF2-40B4-BE49-F238E27FC236}">
-                <a16:creationId xmlns:a16="http://schemas.microsoft.com/office/drawing/2014/main" xmlns="" id="{0BFA6DE6-A228-4AB3-A7E4-61902361C050}"/>
+                <a16:creationId xmlns="" xmlns:a16="http://schemas.microsoft.com/office/drawing/2014/main" id="{0BFA6DE6-A228-4AB3-A7E4-61902361C050}"/>
               </a:ext>
             </a:extLst>
           </p:cNvPr>
@@ -587,7 +586,7 @@
           <p:cNvPr id="3" name="竖排文字占位符 2">
             <a:extLst>
               <a:ext uri="{FF2B5EF4-FFF2-40B4-BE49-F238E27FC236}">
-                <a16:creationId xmlns:a16="http://schemas.microsoft.com/office/drawing/2014/main" xmlns="" id="{4C819E4C-C95B-43F5-A5D1-57448B54625B}"/>
+                <a16:creationId xmlns="" xmlns:a16="http://schemas.microsoft.com/office/drawing/2014/main" id="{4C819E4C-C95B-43F5-A5D1-57448B54625B}"/>
               </a:ext>
             </a:extLst>
           </p:cNvPr>
@@ -649,7 +648,7 @@
           <p:cNvPr id="4" name="日期占位符 3">
             <a:extLst>
               <a:ext uri="{FF2B5EF4-FFF2-40B4-BE49-F238E27FC236}">
-                <a16:creationId xmlns:a16="http://schemas.microsoft.com/office/drawing/2014/main" xmlns="" id="{025CE853-69FA-4CDD-8F53-A0CAC1B4467F}"/>
+                <a16:creationId xmlns="" xmlns:a16="http://schemas.microsoft.com/office/drawing/2014/main" id="{025CE853-69FA-4CDD-8F53-A0CAC1B4467F}"/>
               </a:ext>
             </a:extLst>
           </p:cNvPr>
@@ -667,7 +666,7 @@
           <a:p>
             <a:fld id="{EFF7FE2E-0BFA-440F-91A0-26B1E64D9FE8}" type="datetimeFigureOut">
               <a:rPr lang="zh-CN" altLang="en-US" smtClean="0"/>
-              <a:t>2020/4/9</a:t>
+              <a:t>2020/4/10</a:t>
             </a:fld>
             <a:endParaRPr lang="zh-CN" altLang="en-US"/>
           </a:p>
@@ -678,7 +677,7 @@
           <p:cNvPr id="5" name="页脚占位符 4">
             <a:extLst>
               <a:ext uri="{FF2B5EF4-FFF2-40B4-BE49-F238E27FC236}">
-                <a16:creationId xmlns:a16="http://schemas.microsoft.com/office/drawing/2014/main" xmlns="" id="{0A00A673-E1C6-40F7-9066-CF386072988A}"/>
+                <a16:creationId xmlns="" xmlns:a16="http://schemas.microsoft.com/office/drawing/2014/main" id="{0A00A673-E1C6-40F7-9066-CF386072988A}"/>
               </a:ext>
             </a:extLst>
           </p:cNvPr>
@@ -703,7 +702,7 @@
           <p:cNvPr id="6" name="灯片编号占位符 5">
             <a:extLst>
               <a:ext uri="{FF2B5EF4-FFF2-40B4-BE49-F238E27FC236}">
-                <a16:creationId xmlns:a16="http://schemas.microsoft.com/office/drawing/2014/main" xmlns="" id="{F7F0B521-6709-4E27-A4FC-463B6DAA0068}"/>
+                <a16:creationId xmlns="" xmlns:a16="http://schemas.microsoft.com/office/drawing/2014/main" id="{F7F0B521-6709-4E27-A4FC-463B6DAA0068}"/>
               </a:ext>
             </a:extLst>
           </p:cNvPr>
@@ -762,7 +761,7 @@
           <p:cNvPr id="2" name="标题 1">
             <a:extLst>
               <a:ext uri="{FF2B5EF4-FFF2-40B4-BE49-F238E27FC236}">
-                <a16:creationId xmlns:a16="http://schemas.microsoft.com/office/drawing/2014/main" xmlns="" id="{55171560-D25E-4B37-83EA-706454E3BB48}"/>
+                <a16:creationId xmlns="" xmlns:a16="http://schemas.microsoft.com/office/drawing/2014/main" id="{55171560-D25E-4B37-83EA-706454E3BB48}"/>
               </a:ext>
             </a:extLst>
           </p:cNvPr>
@@ -790,7 +789,7 @@
           <p:cNvPr id="3" name="内容占位符 2">
             <a:extLst>
               <a:ext uri="{FF2B5EF4-FFF2-40B4-BE49-F238E27FC236}">
-                <a16:creationId xmlns:a16="http://schemas.microsoft.com/office/drawing/2014/main" xmlns="" id="{2E4AF173-0BF4-40CD-B292-B280C1BE0457}"/>
+                <a16:creationId xmlns="" xmlns:a16="http://schemas.microsoft.com/office/drawing/2014/main" id="{2E4AF173-0BF4-40CD-B292-B280C1BE0457}"/>
               </a:ext>
             </a:extLst>
           </p:cNvPr>
@@ -847,7 +846,7 @@
           <p:cNvPr id="4" name="日期占位符 3">
             <a:extLst>
               <a:ext uri="{FF2B5EF4-FFF2-40B4-BE49-F238E27FC236}">
-                <a16:creationId xmlns:a16="http://schemas.microsoft.com/office/drawing/2014/main" xmlns="" id="{5630A0C7-B674-47D3-B0DA-0CCDD5066736}"/>
+                <a16:creationId xmlns="" xmlns:a16="http://schemas.microsoft.com/office/drawing/2014/main" id="{5630A0C7-B674-47D3-B0DA-0CCDD5066736}"/>
               </a:ext>
             </a:extLst>
           </p:cNvPr>
@@ -865,7 +864,7 @@
           <a:p>
             <a:fld id="{EFF7FE2E-0BFA-440F-91A0-26B1E64D9FE8}" type="datetimeFigureOut">
               <a:rPr lang="zh-CN" altLang="en-US" smtClean="0"/>
-              <a:t>2020/4/9</a:t>
+              <a:t>2020/4/10</a:t>
             </a:fld>
             <a:endParaRPr lang="zh-CN" altLang="en-US"/>
           </a:p>
@@ -876,7 +875,7 @@
           <p:cNvPr id="5" name="页脚占位符 4">
             <a:extLst>
               <a:ext uri="{FF2B5EF4-FFF2-40B4-BE49-F238E27FC236}">
-                <a16:creationId xmlns:a16="http://schemas.microsoft.com/office/drawing/2014/main" xmlns="" id="{767A6B8D-010C-4AB6-AC96-32A89FB2A408}"/>
+                <a16:creationId xmlns="" xmlns:a16="http://schemas.microsoft.com/office/drawing/2014/main" id="{767A6B8D-010C-4AB6-AC96-32A89FB2A408}"/>
               </a:ext>
             </a:extLst>
           </p:cNvPr>
@@ -901,7 +900,7 @@
           <p:cNvPr id="6" name="灯片编号占位符 5">
             <a:extLst>
               <a:ext uri="{FF2B5EF4-FFF2-40B4-BE49-F238E27FC236}">
-                <a16:creationId xmlns:a16="http://schemas.microsoft.com/office/drawing/2014/main" xmlns="" id="{567295B9-02F0-4ED9-ABAC-D8F4C798EB9D}"/>
+                <a16:creationId xmlns="" xmlns:a16="http://schemas.microsoft.com/office/drawing/2014/main" id="{567295B9-02F0-4ED9-ABAC-D8F4C798EB9D}"/>
               </a:ext>
             </a:extLst>
           </p:cNvPr>
@@ -960,7 +959,7 @@
           <p:cNvPr id="2" name="标题 1">
             <a:extLst>
               <a:ext uri="{FF2B5EF4-FFF2-40B4-BE49-F238E27FC236}">
-                <a16:creationId xmlns:a16="http://schemas.microsoft.com/office/drawing/2014/main" xmlns="" id="{EE555775-689E-4FF3-B4F9-638A61B7DE47}"/>
+                <a16:creationId xmlns="" xmlns:a16="http://schemas.microsoft.com/office/drawing/2014/main" id="{EE555775-689E-4FF3-B4F9-638A61B7DE47}"/>
               </a:ext>
             </a:extLst>
           </p:cNvPr>
@@ -997,7 +996,7 @@
           <p:cNvPr id="3" name="文本占位符 2">
             <a:extLst>
               <a:ext uri="{FF2B5EF4-FFF2-40B4-BE49-F238E27FC236}">
-                <a16:creationId xmlns:a16="http://schemas.microsoft.com/office/drawing/2014/main" xmlns="" id="{89C9A9EB-3CFD-4B03-BB51-8AFEFFC5A80A}"/>
+                <a16:creationId xmlns="" xmlns:a16="http://schemas.microsoft.com/office/drawing/2014/main" id="{89C9A9EB-3CFD-4B03-BB51-8AFEFFC5A80A}"/>
               </a:ext>
             </a:extLst>
           </p:cNvPr>
@@ -1122,7 +1121,7 @@
           <p:cNvPr id="4" name="日期占位符 3">
             <a:extLst>
               <a:ext uri="{FF2B5EF4-FFF2-40B4-BE49-F238E27FC236}">
-                <a16:creationId xmlns:a16="http://schemas.microsoft.com/office/drawing/2014/main" xmlns="" id="{DE1CC08D-843D-439C-8229-7832974CF4EF}"/>
+                <a16:creationId xmlns="" xmlns:a16="http://schemas.microsoft.com/office/drawing/2014/main" id="{DE1CC08D-843D-439C-8229-7832974CF4EF}"/>
               </a:ext>
             </a:extLst>
           </p:cNvPr>
@@ -1140,7 +1139,7 @@
           <a:p>
             <a:fld id="{EFF7FE2E-0BFA-440F-91A0-26B1E64D9FE8}" type="datetimeFigureOut">
               <a:rPr lang="zh-CN" altLang="en-US" smtClean="0"/>
-              <a:t>2020/4/9</a:t>
+              <a:t>2020/4/10</a:t>
             </a:fld>
             <a:endParaRPr lang="zh-CN" altLang="en-US"/>
           </a:p>
@@ -1151,7 +1150,7 @@
           <p:cNvPr id="5" name="页脚占位符 4">
             <a:extLst>
               <a:ext uri="{FF2B5EF4-FFF2-40B4-BE49-F238E27FC236}">
-                <a16:creationId xmlns:a16="http://schemas.microsoft.com/office/drawing/2014/main" xmlns="" id="{789AF5FE-0FBE-44FA-8C8A-ECBC43CDB4C9}"/>
+                <a16:creationId xmlns="" xmlns:a16="http://schemas.microsoft.com/office/drawing/2014/main" id="{789AF5FE-0FBE-44FA-8C8A-ECBC43CDB4C9}"/>
               </a:ext>
             </a:extLst>
           </p:cNvPr>
@@ -1176,7 +1175,7 @@
           <p:cNvPr id="6" name="灯片编号占位符 5">
             <a:extLst>
               <a:ext uri="{FF2B5EF4-FFF2-40B4-BE49-F238E27FC236}">
-                <a16:creationId xmlns:a16="http://schemas.microsoft.com/office/drawing/2014/main" xmlns="" id="{EFA1CB44-C024-45EE-85B2-C46E5F17DC19}"/>
+                <a16:creationId xmlns="" xmlns:a16="http://schemas.microsoft.com/office/drawing/2014/main" id="{EFA1CB44-C024-45EE-85B2-C46E5F17DC19}"/>
               </a:ext>
             </a:extLst>
           </p:cNvPr>
@@ -1235,7 +1234,7 @@
           <p:cNvPr id="2" name="标题 1">
             <a:extLst>
               <a:ext uri="{FF2B5EF4-FFF2-40B4-BE49-F238E27FC236}">
-                <a16:creationId xmlns:a16="http://schemas.microsoft.com/office/drawing/2014/main" xmlns="" id="{967346BE-BEF9-41B0-A796-762D342FB9D4}"/>
+                <a16:creationId xmlns="" xmlns:a16="http://schemas.microsoft.com/office/drawing/2014/main" id="{967346BE-BEF9-41B0-A796-762D342FB9D4}"/>
               </a:ext>
             </a:extLst>
           </p:cNvPr>
@@ -1263,7 +1262,7 @@
           <p:cNvPr id="3" name="内容占位符 2">
             <a:extLst>
               <a:ext uri="{FF2B5EF4-FFF2-40B4-BE49-F238E27FC236}">
-                <a16:creationId xmlns:a16="http://schemas.microsoft.com/office/drawing/2014/main" xmlns="" id="{65BBAC79-D7D8-44DE-ACC9-90E7D5B1C967}"/>
+                <a16:creationId xmlns="" xmlns:a16="http://schemas.microsoft.com/office/drawing/2014/main" id="{65BBAC79-D7D8-44DE-ACC9-90E7D5B1C967}"/>
               </a:ext>
             </a:extLst>
           </p:cNvPr>
@@ -1325,7 +1324,7 @@
           <p:cNvPr id="4" name="内容占位符 3">
             <a:extLst>
               <a:ext uri="{FF2B5EF4-FFF2-40B4-BE49-F238E27FC236}">
-                <a16:creationId xmlns:a16="http://schemas.microsoft.com/office/drawing/2014/main" xmlns="" id="{2D36729B-CB3F-40E6-86B7-113474A22FC6}"/>
+                <a16:creationId xmlns="" xmlns:a16="http://schemas.microsoft.com/office/drawing/2014/main" id="{2D36729B-CB3F-40E6-86B7-113474A22FC6}"/>
               </a:ext>
             </a:extLst>
           </p:cNvPr>
@@ -1387,7 +1386,7 @@
           <p:cNvPr id="5" name="日期占位符 4">
             <a:extLst>
               <a:ext uri="{FF2B5EF4-FFF2-40B4-BE49-F238E27FC236}">
-                <a16:creationId xmlns:a16="http://schemas.microsoft.com/office/drawing/2014/main" xmlns="" id="{808B886E-BED1-4399-B6A4-8AB736AD8B37}"/>
+                <a16:creationId xmlns="" xmlns:a16="http://schemas.microsoft.com/office/drawing/2014/main" id="{808B886E-BED1-4399-B6A4-8AB736AD8B37}"/>
               </a:ext>
             </a:extLst>
           </p:cNvPr>
@@ -1405,7 +1404,7 @@
           <a:p>
             <a:fld id="{EFF7FE2E-0BFA-440F-91A0-26B1E64D9FE8}" type="datetimeFigureOut">
               <a:rPr lang="zh-CN" altLang="en-US" smtClean="0"/>
-              <a:t>2020/4/9</a:t>
+              <a:t>2020/4/10</a:t>
             </a:fld>
             <a:endParaRPr lang="zh-CN" altLang="en-US"/>
           </a:p>
@@ -1416,7 +1415,7 @@
           <p:cNvPr id="6" name="页脚占位符 5">
             <a:extLst>
               <a:ext uri="{FF2B5EF4-FFF2-40B4-BE49-F238E27FC236}">
-                <a16:creationId xmlns:a16="http://schemas.microsoft.com/office/drawing/2014/main" xmlns="" id="{B1427F80-5485-462D-A566-D58CA8D8F64A}"/>
+                <a16:creationId xmlns="" xmlns:a16="http://schemas.microsoft.com/office/drawing/2014/main" id="{B1427F80-5485-462D-A566-D58CA8D8F64A}"/>
               </a:ext>
             </a:extLst>
           </p:cNvPr>
@@ -1441,7 +1440,7 @@
           <p:cNvPr id="7" name="灯片编号占位符 6">
             <a:extLst>
               <a:ext uri="{FF2B5EF4-FFF2-40B4-BE49-F238E27FC236}">
-                <a16:creationId xmlns:a16="http://schemas.microsoft.com/office/drawing/2014/main" xmlns="" id="{6D65D2D1-7C19-482F-A277-BAEC6080676E}"/>
+                <a16:creationId xmlns="" xmlns:a16="http://schemas.microsoft.com/office/drawing/2014/main" id="{6D65D2D1-7C19-482F-A277-BAEC6080676E}"/>
               </a:ext>
             </a:extLst>
           </p:cNvPr>
@@ -1500,7 +1499,7 @@
           <p:cNvPr id="2" name="标题 1">
             <a:extLst>
               <a:ext uri="{FF2B5EF4-FFF2-40B4-BE49-F238E27FC236}">
-                <a16:creationId xmlns:a16="http://schemas.microsoft.com/office/drawing/2014/main" xmlns="" id="{9AA8D665-5BD5-4AE2-9017-CECBD75F7E83}"/>
+                <a16:creationId xmlns="" xmlns:a16="http://schemas.microsoft.com/office/drawing/2014/main" id="{9AA8D665-5BD5-4AE2-9017-CECBD75F7E83}"/>
               </a:ext>
             </a:extLst>
           </p:cNvPr>
@@ -1533,7 +1532,7 @@
           <p:cNvPr id="3" name="文本占位符 2">
             <a:extLst>
               <a:ext uri="{FF2B5EF4-FFF2-40B4-BE49-F238E27FC236}">
-                <a16:creationId xmlns:a16="http://schemas.microsoft.com/office/drawing/2014/main" xmlns="" id="{F09C83FD-80A5-4553-900B-359086814056}"/>
+                <a16:creationId xmlns="" xmlns:a16="http://schemas.microsoft.com/office/drawing/2014/main" id="{F09C83FD-80A5-4553-900B-359086814056}"/>
               </a:ext>
             </a:extLst>
           </p:cNvPr>
@@ -1604,7 +1603,7 @@
           <p:cNvPr id="4" name="内容占位符 3">
             <a:extLst>
               <a:ext uri="{FF2B5EF4-FFF2-40B4-BE49-F238E27FC236}">
-                <a16:creationId xmlns:a16="http://schemas.microsoft.com/office/drawing/2014/main" xmlns="" id="{6C655406-4C5E-4AF7-A9A6-6D427C8BAFF8}"/>
+                <a16:creationId xmlns="" xmlns:a16="http://schemas.microsoft.com/office/drawing/2014/main" id="{6C655406-4C5E-4AF7-A9A6-6D427C8BAFF8}"/>
               </a:ext>
             </a:extLst>
           </p:cNvPr>
@@ -1666,7 +1665,7 @@
           <p:cNvPr id="5" name="文本占位符 4">
             <a:extLst>
               <a:ext uri="{FF2B5EF4-FFF2-40B4-BE49-F238E27FC236}">
-                <a16:creationId xmlns:a16="http://schemas.microsoft.com/office/drawing/2014/main" xmlns="" id="{38C51487-2D6A-4E1F-AA85-A82BA9CEC93E}"/>
+                <a16:creationId xmlns="" xmlns:a16="http://schemas.microsoft.com/office/drawing/2014/main" id="{38C51487-2D6A-4E1F-AA85-A82BA9CEC93E}"/>
               </a:ext>
             </a:extLst>
           </p:cNvPr>
@@ -1737,7 +1736,7 @@
           <p:cNvPr id="6" name="内容占位符 5">
             <a:extLst>
               <a:ext uri="{FF2B5EF4-FFF2-40B4-BE49-F238E27FC236}">
-                <a16:creationId xmlns:a16="http://schemas.microsoft.com/office/drawing/2014/main" xmlns="" id="{752DBB60-66A8-44A9-A9F4-4C7C27CD13A5}"/>
+                <a16:creationId xmlns="" xmlns:a16="http://schemas.microsoft.com/office/drawing/2014/main" id="{752DBB60-66A8-44A9-A9F4-4C7C27CD13A5}"/>
               </a:ext>
             </a:extLst>
           </p:cNvPr>
@@ -1799,7 +1798,7 @@
           <p:cNvPr id="7" name="日期占位符 6">
             <a:extLst>
               <a:ext uri="{FF2B5EF4-FFF2-40B4-BE49-F238E27FC236}">
-                <a16:creationId xmlns:a16="http://schemas.microsoft.com/office/drawing/2014/main" xmlns="" id="{41E4BDCE-0558-4C7F-872B-E8DA495E2BD8}"/>
+                <a16:creationId xmlns="" xmlns:a16="http://schemas.microsoft.com/office/drawing/2014/main" id="{41E4BDCE-0558-4C7F-872B-E8DA495E2BD8}"/>
               </a:ext>
             </a:extLst>
           </p:cNvPr>
@@ -1817,7 +1816,7 @@
           <a:p>
             <a:fld id="{EFF7FE2E-0BFA-440F-91A0-26B1E64D9FE8}" type="datetimeFigureOut">
               <a:rPr lang="zh-CN" altLang="en-US" smtClean="0"/>
-              <a:t>2020/4/9</a:t>
+              <a:t>2020/4/10</a:t>
             </a:fld>
             <a:endParaRPr lang="zh-CN" altLang="en-US"/>
           </a:p>
@@ -1828,7 +1827,7 @@
           <p:cNvPr id="8" name="页脚占位符 7">
             <a:extLst>
               <a:ext uri="{FF2B5EF4-FFF2-40B4-BE49-F238E27FC236}">
-                <a16:creationId xmlns:a16="http://schemas.microsoft.com/office/drawing/2014/main" xmlns="" id="{E55764E7-5CD6-4AD9-9D54-22086712D63E}"/>
+                <a16:creationId xmlns="" xmlns:a16="http://schemas.microsoft.com/office/drawing/2014/main" id="{E55764E7-5CD6-4AD9-9D54-22086712D63E}"/>
               </a:ext>
             </a:extLst>
           </p:cNvPr>
@@ -1853,7 +1852,7 @@
           <p:cNvPr id="9" name="灯片编号占位符 8">
             <a:extLst>
               <a:ext uri="{FF2B5EF4-FFF2-40B4-BE49-F238E27FC236}">
-                <a16:creationId xmlns:a16="http://schemas.microsoft.com/office/drawing/2014/main" xmlns="" id="{E25E2BED-42EC-415D-9008-1AF88F044636}"/>
+                <a16:creationId xmlns="" xmlns:a16="http://schemas.microsoft.com/office/drawing/2014/main" id="{E25E2BED-42EC-415D-9008-1AF88F044636}"/>
               </a:ext>
             </a:extLst>
           </p:cNvPr>
@@ -1912,7 +1911,7 @@
           <p:cNvPr id="2" name="标题 1">
             <a:extLst>
               <a:ext uri="{FF2B5EF4-FFF2-40B4-BE49-F238E27FC236}">
-                <a16:creationId xmlns:a16="http://schemas.microsoft.com/office/drawing/2014/main" xmlns="" id="{1594AB2C-4A78-47E5-BAC0-4E5FD0B193D8}"/>
+                <a16:creationId xmlns="" xmlns:a16="http://schemas.microsoft.com/office/drawing/2014/main" id="{1594AB2C-4A78-47E5-BAC0-4E5FD0B193D8}"/>
               </a:ext>
             </a:extLst>
           </p:cNvPr>
@@ -1940,7 +1939,7 @@
           <p:cNvPr id="3" name="日期占位符 2">
             <a:extLst>
               <a:ext uri="{FF2B5EF4-FFF2-40B4-BE49-F238E27FC236}">
-                <a16:creationId xmlns:a16="http://schemas.microsoft.com/office/drawing/2014/main" xmlns="" id="{1B8CB7E8-EC7A-4EE0-9741-839717CC24CC}"/>
+                <a16:creationId xmlns="" xmlns:a16="http://schemas.microsoft.com/office/drawing/2014/main" id="{1B8CB7E8-EC7A-4EE0-9741-839717CC24CC}"/>
               </a:ext>
             </a:extLst>
           </p:cNvPr>
@@ -1958,7 +1957,7 @@
           <a:p>
             <a:fld id="{EFF7FE2E-0BFA-440F-91A0-26B1E64D9FE8}" type="datetimeFigureOut">
               <a:rPr lang="zh-CN" altLang="en-US" smtClean="0"/>
-              <a:t>2020/4/9</a:t>
+              <a:t>2020/4/10</a:t>
             </a:fld>
             <a:endParaRPr lang="zh-CN" altLang="en-US"/>
           </a:p>
@@ -1969,7 +1968,7 @@
           <p:cNvPr id="4" name="页脚占位符 3">
             <a:extLst>
               <a:ext uri="{FF2B5EF4-FFF2-40B4-BE49-F238E27FC236}">
-                <a16:creationId xmlns:a16="http://schemas.microsoft.com/office/drawing/2014/main" xmlns="" id="{5E1BEB69-9104-4E53-A8F4-798648EC057D}"/>
+                <a16:creationId xmlns="" xmlns:a16="http://schemas.microsoft.com/office/drawing/2014/main" id="{5E1BEB69-9104-4E53-A8F4-798648EC057D}"/>
               </a:ext>
             </a:extLst>
           </p:cNvPr>
@@ -1994,7 +1993,7 @@
           <p:cNvPr id="5" name="灯片编号占位符 4">
             <a:extLst>
               <a:ext uri="{FF2B5EF4-FFF2-40B4-BE49-F238E27FC236}">
-                <a16:creationId xmlns:a16="http://schemas.microsoft.com/office/drawing/2014/main" xmlns="" id="{F85D312C-5CA1-427F-9866-6FE5C34A970C}"/>
+                <a16:creationId xmlns="" xmlns:a16="http://schemas.microsoft.com/office/drawing/2014/main" id="{F85D312C-5CA1-427F-9866-6FE5C34A970C}"/>
               </a:ext>
             </a:extLst>
           </p:cNvPr>
@@ -2053,7 +2052,7 @@
           <p:cNvPr id="2" name="日期占位符 1">
             <a:extLst>
               <a:ext uri="{FF2B5EF4-FFF2-40B4-BE49-F238E27FC236}">
-                <a16:creationId xmlns:a16="http://schemas.microsoft.com/office/drawing/2014/main" xmlns="" id="{B7E5C86A-0105-47B8-A853-7357D63FC21C}"/>
+                <a16:creationId xmlns="" xmlns:a16="http://schemas.microsoft.com/office/drawing/2014/main" id="{B7E5C86A-0105-47B8-A853-7357D63FC21C}"/>
               </a:ext>
             </a:extLst>
           </p:cNvPr>
@@ -2071,7 +2070,7 @@
           <a:p>
             <a:fld id="{EFF7FE2E-0BFA-440F-91A0-26B1E64D9FE8}" type="datetimeFigureOut">
               <a:rPr lang="zh-CN" altLang="en-US" smtClean="0"/>
-              <a:t>2020/4/9</a:t>
+              <a:t>2020/4/10</a:t>
             </a:fld>
             <a:endParaRPr lang="zh-CN" altLang="en-US"/>
           </a:p>
@@ -2082,7 +2081,7 @@
           <p:cNvPr id="3" name="页脚占位符 2">
             <a:extLst>
               <a:ext uri="{FF2B5EF4-FFF2-40B4-BE49-F238E27FC236}">
-                <a16:creationId xmlns:a16="http://schemas.microsoft.com/office/drawing/2014/main" xmlns="" id="{1624594F-2F24-40FF-B64E-2FF19828A4FF}"/>
+                <a16:creationId xmlns="" xmlns:a16="http://schemas.microsoft.com/office/drawing/2014/main" id="{1624594F-2F24-40FF-B64E-2FF19828A4FF}"/>
               </a:ext>
             </a:extLst>
           </p:cNvPr>
@@ -2107,7 +2106,7 @@
           <p:cNvPr id="4" name="灯片编号占位符 3">
             <a:extLst>
               <a:ext uri="{FF2B5EF4-FFF2-40B4-BE49-F238E27FC236}">
-                <a16:creationId xmlns:a16="http://schemas.microsoft.com/office/drawing/2014/main" xmlns="" id="{339C07DA-EAFC-4FDC-8A01-C0E14D931E65}"/>
+                <a16:creationId xmlns="" xmlns:a16="http://schemas.microsoft.com/office/drawing/2014/main" id="{339C07DA-EAFC-4FDC-8A01-C0E14D931E65}"/>
               </a:ext>
             </a:extLst>
           </p:cNvPr>
@@ -2166,7 +2165,7 @@
           <p:cNvPr id="2" name="标题 1">
             <a:extLst>
               <a:ext uri="{FF2B5EF4-FFF2-40B4-BE49-F238E27FC236}">
-                <a16:creationId xmlns:a16="http://schemas.microsoft.com/office/drawing/2014/main" xmlns="" id="{D608314D-802D-47BA-8D72-7E30A92B0D07}"/>
+                <a16:creationId xmlns="" xmlns:a16="http://schemas.microsoft.com/office/drawing/2014/main" id="{D608314D-802D-47BA-8D72-7E30A92B0D07}"/>
               </a:ext>
             </a:extLst>
           </p:cNvPr>
@@ -2203,7 +2202,7 @@
           <p:cNvPr id="3" name="内容占位符 2">
             <a:extLst>
               <a:ext uri="{FF2B5EF4-FFF2-40B4-BE49-F238E27FC236}">
-                <a16:creationId xmlns:a16="http://schemas.microsoft.com/office/drawing/2014/main" xmlns="" id="{B512050C-B963-4BAD-82AB-15C3A5EF84A3}"/>
+                <a16:creationId xmlns="" xmlns:a16="http://schemas.microsoft.com/office/drawing/2014/main" id="{B512050C-B963-4BAD-82AB-15C3A5EF84A3}"/>
               </a:ext>
             </a:extLst>
           </p:cNvPr>
@@ -2293,7 +2292,7 @@
           <p:cNvPr id="4" name="文本占位符 3">
             <a:extLst>
               <a:ext uri="{FF2B5EF4-FFF2-40B4-BE49-F238E27FC236}">
-                <a16:creationId xmlns:a16="http://schemas.microsoft.com/office/drawing/2014/main" xmlns="" id="{1D4C2F97-FB24-49AB-9623-50376AFBAB8D}"/>
+                <a16:creationId xmlns="" xmlns:a16="http://schemas.microsoft.com/office/drawing/2014/main" id="{1D4C2F97-FB24-49AB-9623-50376AFBAB8D}"/>
               </a:ext>
             </a:extLst>
           </p:cNvPr>
@@ -2364,7 +2363,7 @@
           <p:cNvPr id="5" name="日期占位符 4">
             <a:extLst>
               <a:ext uri="{FF2B5EF4-FFF2-40B4-BE49-F238E27FC236}">
-                <a16:creationId xmlns:a16="http://schemas.microsoft.com/office/drawing/2014/main" xmlns="" id="{C37C9E5A-BDDB-4ED8-979A-12EEBE31ABE8}"/>
+                <a16:creationId xmlns="" xmlns:a16="http://schemas.microsoft.com/office/drawing/2014/main" id="{C37C9E5A-BDDB-4ED8-979A-12EEBE31ABE8}"/>
               </a:ext>
             </a:extLst>
           </p:cNvPr>
@@ -2382,7 +2381,7 @@
           <a:p>
             <a:fld id="{EFF7FE2E-0BFA-440F-91A0-26B1E64D9FE8}" type="datetimeFigureOut">
               <a:rPr lang="zh-CN" altLang="en-US" smtClean="0"/>
-              <a:t>2020/4/9</a:t>
+              <a:t>2020/4/10</a:t>
             </a:fld>
             <a:endParaRPr lang="zh-CN" altLang="en-US"/>
           </a:p>
@@ -2393,7 +2392,7 @@
           <p:cNvPr id="6" name="页脚占位符 5">
             <a:extLst>
               <a:ext uri="{FF2B5EF4-FFF2-40B4-BE49-F238E27FC236}">
-                <a16:creationId xmlns:a16="http://schemas.microsoft.com/office/drawing/2014/main" xmlns="" id="{A2BF3395-2090-4A31-AF16-E659CF946E16}"/>
+                <a16:creationId xmlns="" xmlns:a16="http://schemas.microsoft.com/office/drawing/2014/main" id="{A2BF3395-2090-4A31-AF16-E659CF946E16}"/>
               </a:ext>
             </a:extLst>
           </p:cNvPr>
@@ -2418,7 +2417,7 @@
           <p:cNvPr id="7" name="灯片编号占位符 6">
             <a:extLst>
               <a:ext uri="{FF2B5EF4-FFF2-40B4-BE49-F238E27FC236}">
-                <a16:creationId xmlns:a16="http://schemas.microsoft.com/office/drawing/2014/main" xmlns="" id="{2591CAF1-99B6-4DC4-B1E3-094668A13590}"/>
+                <a16:creationId xmlns="" xmlns:a16="http://schemas.microsoft.com/office/drawing/2014/main" id="{2591CAF1-99B6-4DC4-B1E3-094668A13590}"/>
               </a:ext>
             </a:extLst>
           </p:cNvPr>
@@ -2477,7 +2476,7 @@
           <p:cNvPr id="2" name="标题 1">
             <a:extLst>
               <a:ext uri="{FF2B5EF4-FFF2-40B4-BE49-F238E27FC236}">
-                <a16:creationId xmlns:a16="http://schemas.microsoft.com/office/drawing/2014/main" xmlns="" id="{55A00401-B04D-487C-BD2A-E326C831E69E}"/>
+                <a16:creationId xmlns="" xmlns:a16="http://schemas.microsoft.com/office/drawing/2014/main" id="{55A00401-B04D-487C-BD2A-E326C831E69E}"/>
               </a:ext>
             </a:extLst>
           </p:cNvPr>
@@ -2514,7 +2513,7 @@
           <p:cNvPr id="3" name="图片占位符 2">
             <a:extLst>
               <a:ext uri="{FF2B5EF4-FFF2-40B4-BE49-F238E27FC236}">
-                <a16:creationId xmlns:a16="http://schemas.microsoft.com/office/drawing/2014/main" xmlns="" id="{E82EE53E-2AB1-4F63-90D6-5729D1A0564C}"/>
+                <a16:creationId xmlns="" xmlns:a16="http://schemas.microsoft.com/office/drawing/2014/main" id="{E82EE53E-2AB1-4F63-90D6-5729D1A0564C}"/>
               </a:ext>
             </a:extLst>
           </p:cNvPr>
@@ -2581,7 +2580,7 @@
           <p:cNvPr id="4" name="文本占位符 3">
             <a:extLst>
               <a:ext uri="{FF2B5EF4-FFF2-40B4-BE49-F238E27FC236}">
-                <a16:creationId xmlns:a16="http://schemas.microsoft.com/office/drawing/2014/main" xmlns="" id="{255D4B02-7EB9-41D6-AEC4-89F2B5991002}"/>
+                <a16:creationId xmlns="" xmlns:a16="http://schemas.microsoft.com/office/drawing/2014/main" id="{255D4B02-7EB9-41D6-AEC4-89F2B5991002}"/>
               </a:ext>
             </a:extLst>
           </p:cNvPr>
@@ -2652,7 +2651,7 @@
           <p:cNvPr id="5" name="日期占位符 4">
             <a:extLst>
               <a:ext uri="{FF2B5EF4-FFF2-40B4-BE49-F238E27FC236}">
-                <a16:creationId xmlns:a16="http://schemas.microsoft.com/office/drawing/2014/main" xmlns="" id="{FC18645B-DE93-4921-A605-1061D76EE548}"/>
+                <a16:creationId xmlns="" xmlns:a16="http://schemas.microsoft.com/office/drawing/2014/main" id="{FC18645B-DE93-4921-A605-1061D76EE548}"/>
               </a:ext>
             </a:extLst>
           </p:cNvPr>
@@ -2670,7 +2669,7 @@
           <a:p>
             <a:fld id="{EFF7FE2E-0BFA-440F-91A0-26B1E64D9FE8}" type="datetimeFigureOut">
               <a:rPr lang="zh-CN" altLang="en-US" smtClean="0"/>
-              <a:t>2020/4/9</a:t>
+              <a:t>2020/4/10</a:t>
             </a:fld>
             <a:endParaRPr lang="zh-CN" altLang="en-US"/>
           </a:p>
@@ -2681,7 +2680,7 @@
           <p:cNvPr id="6" name="页脚占位符 5">
             <a:extLst>
               <a:ext uri="{FF2B5EF4-FFF2-40B4-BE49-F238E27FC236}">
-                <a16:creationId xmlns:a16="http://schemas.microsoft.com/office/drawing/2014/main" xmlns="" id="{9C800F48-296D-4ED7-94FB-A145C66BCB43}"/>
+                <a16:creationId xmlns="" xmlns:a16="http://schemas.microsoft.com/office/drawing/2014/main" id="{9C800F48-296D-4ED7-94FB-A145C66BCB43}"/>
               </a:ext>
             </a:extLst>
           </p:cNvPr>
@@ -2706,7 +2705,7 @@
           <p:cNvPr id="7" name="灯片编号占位符 6">
             <a:extLst>
               <a:ext uri="{FF2B5EF4-FFF2-40B4-BE49-F238E27FC236}">
-                <a16:creationId xmlns:a16="http://schemas.microsoft.com/office/drawing/2014/main" xmlns="" id="{6884452E-5231-4C73-9225-BAA8F72E5456}"/>
+                <a16:creationId xmlns="" xmlns:a16="http://schemas.microsoft.com/office/drawing/2014/main" id="{6884452E-5231-4C73-9225-BAA8F72E5456}"/>
               </a:ext>
             </a:extLst>
           </p:cNvPr>
@@ -2770,7 +2769,7 @@
           <p:cNvPr id="2" name="标题占位符 1">
             <a:extLst>
               <a:ext uri="{FF2B5EF4-FFF2-40B4-BE49-F238E27FC236}">
-                <a16:creationId xmlns:a16="http://schemas.microsoft.com/office/drawing/2014/main" xmlns="" id="{AE21C4E6-88D9-46BF-ACD9-75598408650C}"/>
+                <a16:creationId xmlns="" xmlns:a16="http://schemas.microsoft.com/office/drawing/2014/main" id="{AE21C4E6-88D9-46BF-ACD9-75598408650C}"/>
               </a:ext>
             </a:extLst>
           </p:cNvPr>
@@ -2808,7 +2807,7 @@
           <p:cNvPr id="3" name="文本占位符 2">
             <a:extLst>
               <a:ext uri="{FF2B5EF4-FFF2-40B4-BE49-F238E27FC236}">
-                <a16:creationId xmlns:a16="http://schemas.microsoft.com/office/drawing/2014/main" xmlns="" id="{3A1710DA-604B-4084-AA4E-5FB0451465FA}"/>
+                <a16:creationId xmlns="" xmlns:a16="http://schemas.microsoft.com/office/drawing/2014/main" id="{3A1710DA-604B-4084-AA4E-5FB0451465FA}"/>
               </a:ext>
             </a:extLst>
           </p:cNvPr>
@@ -2875,7 +2874,7 @@
           <p:cNvPr id="4" name="日期占位符 3">
             <a:extLst>
               <a:ext uri="{FF2B5EF4-FFF2-40B4-BE49-F238E27FC236}">
-                <a16:creationId xmlns:a16="http://schemas.microsoft.com/office/drawing/2014/main" xmlns="" id="{08ABAE5B-D10C-4E3E-B41F-064B5432664D}"/>
+                <a16:creationId xmlns="" xmlns:a16="http://schemas.microsoft.com/office/drawing/2014/main" id="{08ABAE5B-D10C-4E3E-B41F-064B5432664D}"/>
               </a:ext>
             </a:extLst>
           </p:cNvPr>
@@ -2911,7 +2910,7 @@
           <a:p>
             <a:fld id="{EFF7FE2E-0BFA-440F-91A0-26B1E64D9FE8}" type="datetimeFigureOut">
               <a:rPr lang="zh-CN" altLang="en-US" smtClean="0"/>
-              <a:t>2020/4/9</a:t>
+              <a:t>2020/4/10</a:t>
             </a:fld>
             <a:endParaRPr lang="zh-CN" altLang="en-US"/>
           </a:p>
@@ -2922,7 +2921,7 @@
           <p:cNvPr id="5" name="页脚占位符 4">
             <a:extLst>
               <a:ext uri="{FF2B5EF4-FFF2-40B4-BE49-F238E27FC236}">
-                <a16:creationId xmlns:a16="http://schemas.microsoft.com/office/drawing/2014/main" xmlns="" id="{99B6FB56-A15A-4280-B3D8-0E5F33DB3E83}"/>
+                <a16:creationId xmlns="" xmlns:a16="http://schemas.microsoft.com/office/drawing/2014/main" id="{99B6FB56-A15A-4280-B3D8-0E5F33DB3E83}"/>
               </a:ext>
             </a:extLst>
           </p:cNvPr>
@@ -2965,7 +2964,7 @@
           <p:cNvPr id="6" name="灯片编号占位符 5">
             <a:extLst>
               <a:ext uri="{FF2B5EF4-FFF2-40B4-BE49-F238E27FC236}">
-                <a16:creationId xmlns:a16="http://schemas.microsoft.com/office/drawing/2014/main" xmlns="" id="{74DBB2F3-CC6E-44E8-8EF6-E3789D94CA42}"/>
+                <a16:creationId xmlns="" xmlns:a16="http://schemas.microsoft.com/office/drawing/2014/main" id="{74DBB2F3-CC6E-44E8-8EF6-E3789D94CA42}"/>
               </a:ext>
             </a:extLst>
           </p:cNvPr>
@@ -3333,7 +3332,7 @@
           <p:cNvPr id="5" name="图片 4">
             <a:extLst>
               <a:ext uri="{FF2B5EF4-FFF2-40B4-BE49-F238E27FC236}">
-                <a16:creationId xmlns:a16="http://schemas.microsoft.com/office/drawing/2014/main" xmlns="" id="{0CC54C41-9BC6-4D94-A499-3D182CFE6BF5}"/>
+                <a16:creationId xmlns="" xmlns:a16="http://schemas.microsoft.com/office/drawing/2014/main" id="{0CC54C41-9BC6-4D94-A499-3D182CFE6BF5}"/>
               </a:ext>
             </a:extLst>
           </p:cNvPr>
@@ -3363,7 +3362,7 @@
           <p:cNvPr id="6" name="文本框 5">
             <a:extLst>
               <a:ext uri="{FF2B5EF4-FFF2-40B4-BE49-F238E27FC236}">
-                <a16:creationId xmlns:a16="http://schemas.microsoft.com/office/drawing/2014/main" xmlns="" id="{5AFF3F3A-0D8E-4820-8059-8AF3749A5227}"/>
+                <a16:creationId xmlns="" xmlns:a16="http://schemas.microsoft.com/office/drawing/2014/main" id="{5AFF3F3A-0D8E-4820-8059-8AF3749A5227}"/>
               </a:ext>
             </a:extLst>
           </p:cNvPr>
@@ -3429,7 +3428,7 @@
           <p:cNvPr id="4" name="图片 3">
             <a:extLst>
               <a:ext uri="{FF2B5EF4-FFF2-40B4-BE49-F238E27FC236}">
-                <a16:creationId xmlns:a16="http://schemas.microsoft.com/office/drawing/2014/main" xmlns="" id="{FFDB3227-29A5-4D2A-80BD-2CD99EF0496A}"/>
+                <a16:creationId xmlns="" xmlns:a16="http://schemas.microsoft.com/office/drawing/2014/main" id="{FFDB3227-29A5-4D2A-80BD-2CD99EF0496A}"/>
               </a:ext>
             </a:extLst>
           </p:cNvPr>
@@ -3459,7 +3458,7 @@
           <p:cNvPr id="3" name="矩形 2">
             <a:extLst>
               <a:ext uri="{FF2B5EF4-FFF2-40B4-BE49-F238E27FC236}">
-                <a16:creationId xmlns:a16="http://schemas.microsoft.com/office/drawing/2014/main" xmlns="" id="{F87FE588-96C6-40A7-9B1A-20B16E1C808B}"/>
+                <a16:creationId xmlns="" xmlns:a16="http://schemas.microsoft.com/office/drawing/2014/main" id="{F87FE588-96C6-40A7-9B1A-20B16E1C808B}"/>
               </a:ext>
             </a:extLst>
           </p:cNvPr>
@@ -3510,161 +3509,6 @@
     <p:extLst>
       <p:ext uri="{BB962C8B-B14F-4D97-AF65-F5344CB8AC3E}">
         <p14:creationId xmlns:p14="http://schemas.microsoft.com/office/powerpoint/2010/main" val="2665458011"/>
-      </p:ext>
-    </p:extLst>
-  </p:cSld>
-  <p:clrMapOvr>
-    <a:masterClrMapping/>
-  </p:clrMapOvr>
-</p:sld>
-</file>
-
-<file path=ppt/slides/slide3.xml><?xml version="1.0" encoding="utf-8"?>
-<p:sld xmlns:a="http://schemas.openxmlformats.org/drawingml/2006/main" xmlns:r="http://schemas.openxmlformats.org/officeDocument/2006/relationships" xmlns:p="http://schemas.openxmlformats.org/presentationml/2006/main">
-  <p:cSld>
-    <p:spTree>
-      <p:nvGrpSpPr>
-        <p:cNvPr id="1" name=""/>
-        <p:cNvGrpSpPr/>
-        <p:nvPr/>
-      </p:nvGrpSpPr>
-      <p:grpSpPr>
-        <a:xfrm>
-          <a:off x="0" y="0"/>
-          <a:ext cx="0" cy="0"/>
-          <a:chOff x="0" y="0"/>
-          <a:chExt cx="0" cy="0"/>
-        </a:xfrm>
-      </p:grpSpPr>
-      <p:pic>
-        <p:nvPicPr>
-          <p:cNvPr id="5" name="图片 4"/>
-          <p:cNvPicPr>
-            <a:picLocks noChangeAspect="1"/>
-          </p:cNvPicPr>
-          <p:nvPr/>
-        </p:nvPicPr>
-        <p:blipFill>
-          <a:blip r:embed="rId2"/>
-          <a:stretch>
-            <a:fillRect/>
-          </a:stretch>
-        </p:blipFill>
-        <p:spPr>
-          <a:xfrm>
-            <a:off x="435428" y="155016"/>
-            <a:ext cx="6834002" cy="4514956"/>
-          </a:xfrm>
-          <a:prstGeom prst="rect">
-            <a:avLst/>
-          </a:prstGeom>
-        </p:spPr>
-      </p:pic>
-      <p:sp>
-        <p:nvSpPr>
-          <p:cNvPr id="6" name="文本框 5"/>
-          <p:cNvSpPr txBox="1"/>
-          <p:nvPr/>
-        </p:nvSpPr>
-        <p:spPr>
-          <a:xfrm>
-            <a:off x="435428" y="5649686"/>
-            <a:ext cx="10780515" cy="646331"/>
-          </a:xfrm>
-          <a:prstGeom prst="rect">
-            <a:avLst/>
-          </a:prstGeom>
-          <a:noFill/>
-        </p:spPr>
-        <p:txBody>
-          <a:bodyPr wrap="none" rtlCol="0">
-            <a:spAutoFit/>
-          </a:bodyPr>
-          <a:lstStyle/>
-          <a:p>
-            <a:r>
-              <a:rPr kumimoji="1" lang="en-US" altLang="zh-CN" dirty="0" smtClean="0"/>
-              <a:t>ENCODE</a:t>
-            </a:r>
-            <a:r>
-              <a:rPr kumimoji="1" lang="zh-CN" altLang="en-US" dirty="0" smtClean="0"/>
-              <a:t> 每个</a:t>
-            </a:r>
-            <a:r>
-              <a:rPr kumimoji="1" lang="en-US" altLang="zh-CN" dirty="0" smtClean="0"/>
-              <a:t>Chip-</a:t>
-            </a:r>
-            <a:r>
-              <a:rPr kumimoji="1" lang="en-US" altLang="zh-CN" dirty="0" err="1" smtClean="0"/>
-              <a:t>seq</a:t>
-            </a:r>
-            <a:r>
-              <a:rPr kumimoji="1" lang="zh-CN" altLang="en-US" dirty="0" smtClean="0"/>
-              <a:t>数据集有</a:t>
-            </a:r>
-            <a:r>
-              <a:rPr kumimoji="1" lang="en-US" altLang="zh-CN" dirty="0" smtClean="0"/>
-              <a:t>2</a:t>
-            </a:r>
-            <a:r>
-              <a:rPr kumimoji="1" lang="zh-CN" altLang="en-US" dirty="0" smtClean="0"/>
-              <a:t>个</a:t>
-            </a:r>
-            <a:r>
-              <a:rPr kumimoji="1" lang="en-US" altLang="zh-CN" dirty="0" smtClean="0"/>
-              <a:t>bam</a:t>
-            </a:r>
-            <a:r>
-              <a:rPr kumimoji="1" lang="zh-CN" altLang="en-US" dirty="0" smtClean="0"/>
-              <a:t>文件，但文件的</a:t>
-            </a:r>
-            <a:r>
-              <a:rPr kumimoji="1" lang="en-US" altLang="zh-CN" dirty="0" smtClean="0"/>
-              <a:t>red</a:t>
-            </a:r>
-            <a:r>
-              <a:rPr kumimoji="1" lang="zh-CN" altLang="en-US" dirty="0" smtClean="0"/>
-              <a:t>信息和最后的信号信息看起来并不是对应的。</a:t>
-            </a:r>
-            <a:endParaRPr kumimoji="1" lang="en-US" altLang="zh-CN" dirty="0" smtClean="0"/>
-          </a:p>
-          <a:p>
-            <a:r>
-              <a:rPr kumimoji="1" lang="zh-CN" altLang="en-US" dirty="0" smtClean="0"/>
-              <a:t>下面蓝色的曲线根网站上交互式看到的是一模一样的（包括数值），所以后续要以这个为准。</a:t>
-            </a:r>
-            <a:endParaRPr kumimoji="1" lang="zh-CN" altLang="en-US" dirty="0"/>
-          </a:p>
-        </p:txBody>
-      </p:sp>
-      <p:pic>
-        <p:nvPicPr>
-          <p:cNvPr id="7" name="图片 6"/>
-          <p:cNvPicPr>
-            <a:picLocks noChangeAspect="1"/>
-          </p:cNvPicPr>
-          <p:nvPr/>
-        </p:nvPicPr>
-        <p:blipFill>
-          <a:blip r:embed="rId3"/>
-          <a:stretch>
-            <a:fillRect/>
-          </a:stretch>
-        </p:blipFill>
-        <p:spPr>
-          <a:xfrm>
-            <a:off x="5940186" y="4359729"/>
-            <a:ext cx="6044986" cy="1289957"/>
-          </a:xfrm>
-          <a:prstGeom prst="rect">
-            <a:avLst/>
-          </a:prstGeom>
-        </p:spPr>
-      </p:pic>
-    </p:spTree>
-    <p:extLst>
-      <p:ext uri="{BB962C8B-B14F-4D97-AF65-F5344CB8AC3E}">
-        <p14:creationId xmlns:p14="http://schemas.microsoft.com/office/powerpoint/2010/main" val="1149499859"/>
       </p:ext>
     </p:extLst>
   </p:cSld>

</xml_diff>